<commit_message>
adding movies management collection
</commit_message>
<xml_diff>
--- a/content/ACELERA - Postman.pptx
+++ b/content/ACELERA - Postman.pptx
@@ -258,7 +258,7 @@
           <a:p>
             <a:fld id="{BF390588-C9D9-499D-AA8D-AD4923B0DD08}" type="datetimeFigureOut">
               <a:rPr lang="pt-BR" smtClean="0"/>
-              <a:t>25/06/2019</a:t>
+              <a:t>01/07/2019</a:t>
             </a:fld>
             <a:endParaRPr lang="pt-BR"/>
           </a:p>
@@ -423,7 +423,7 @@
           <a:p>
             <a:fld id="{4FB5C509-E37D-4178-90C9-6B30A0EA5D8E}" type="datetimeFigureOut">
               <a:rPr lang="pt-BR" smtClean="0"/>
-              <a:t>25/06/2019</a:t>
+              <a:t>01/07/2019</a:t>
             </a:fld>
             <a:endParaRPr lang="pt-BR"/>
           </a:p>
@@ -1198,7 +1198,7 @@
                 </a:solidFill>
               </a:rPr>
               <a:pPr/>
-              <a:t>25/06/2019</a:t>
+              <a:t>01/07/2019</a:t>
             </a:fld>
             <a:endParaRPr lang="pt-BR">
               <a:solidFill>
@@ -1398,7 +1398,7 @@
                 </a:solidFill>
               </a:rPr>
               <a:pPr/>
-              <a:t>25/06/2019</a:t>
+              <a:t>01/07/2019</a:t>
             </a:fld>
             <a:endParaRPr lang="pt-BR">
               <a:solidFill>
@@ -1608,7 +1608,7 @@
                 </a:solidFill>
               </a:rPr>
               <a:pPr/>
-              <a:t>25/06/2019</a:t>
+              <a:t>01/07/2019</a:t>
             </a:fld>
             <a:endParaRPr lang="pt-BR">
               <a:solidFill>
@@ -1939,7 +1939,7 @@
                 </a:solidFill>
               </a:rPr>
               <a:pPr/>
-              <a:t>25/06/2019</a:t>
+              <a:t>01/07/2019</a:t>
             </a:fld>
             <a:endParaRPr lang="pt-BR">
               <a:solidFill>
@@ -2256,7 +2256,7 @@
                 </a:solidFill>
               </a:rPr>
               <a:pPr/>
-              <a:t>25/06/2019</a:t>
+              <a:t>01/07/2019</a:t>
             </a:fld>
             <a:endParaRPr lang="pt-BR">
               <a:solidFill>
@@ -2517,7 +2517,7 @@
                 </a:solidFill>
               </a:rPr>
               <a:pPr/>
-              <a:t>25/06/2019</a:t>
+              <a:t>01/07/2019</a:t>
             </a:fld>
             <a:endParaRPr lang="pt-BR">
               <a:solidFill>
@@ -2913,7 +2913,7 @@
                 </a:solidFill>
               </a:rPr>
               <a:pPr/>
-              <a:t>25/06/2019</a:t>
+              <a:t>01/07/2019</a:t>
             </a:fld>
             <a:endParaRPr lang="pt-BR">
               <a:solidFill>
@@ -3716,7 +3716,7 @@
                 </a:solidFill>
               </a:rPr>
               <a:pPr/>
-              <a:t>25/06/2019</a:t>
+              <a:t>01/07/2019</a:t>
             </a:fld>
             <a:endParaRPr lang="pt-BR">
               <a:solidFill>
@@ -3962,7 +3962,7 @@
                 </a:solidFill>
               </a:rPr>
               <a:pPr/>
-              <a:t>25/06/2019</a:t>
+              <a:t>01/07/2019</a:t>
             </a:fld>
             <a:endParaRPr lang="pt-BR">
               <a:solidFill>
@@ -6117,6 +6117,75 @@
           <a:p>
             <a:pPr algn="r"/>
             <a:r>
+              <a:rPr lang="pt-BR" sz="2400" dirty="0" err="1">
+                <a:solidFill>
+                  <a:schemeClr val="bg2">
+                    <a:lumMod val="25000"/>
+                  </a:schemeClr>
+                </a:solidFill>
+                <a:cs typeface="Segoe UI Light" panose="020B0502040204020203" pitchFamily="34" charset="0"/>
+              </a:rPr>
+              <a:t>Workspaces</a:t>
+            </a:r>
+            <a:endParaRPr lang="pt-BR" sz="2400" dirty="0">
+              <a:solidFill>
+                <a:schemeClr val="bg2">
+                  <a:lumMod val="25000"/>
+                </a:schemeClr>
+              </a:solidFill>
+              <a:cs typeface="Segoe UI Light" panose="020B0502040204020203" pitchFamily="34" charset="0"/>
+            </a:endParaRPr>
+          </a:p>
+          <a:p>
+            <a:pPr algn="r"/>
+            <a:endParaRPr lang="pt-BR" sz="2400" dirty="0">
+              <a:solidFill>
+                <a:schemeClr val="bg2">
+                  <a:lumMod val="25000"/>
+                </a:schemeClr>
+              </a:solidFill>
+              <a:cs typeface="Segoe UI Light" panose="020B0502040204020203" pitchFamily="34" charset="0"/>
+            </a:endParaRPr>
+          </a:p>
+          <a:p>
+            <a:pPr algn="r"/>
+            <a:r>
+              <a:rPr lang="pt-BR" sz="2400" dirty="0" err="1">
+                <a:solidFill>
+                  <a:schemeClr val="bg2">
+                    <a:lumMod val="25000"/>
+                  </a:schemeClr>
+                </a:solidFill>
+                <a:cs typeface="Segoe UI Light" panose="020B0502040204020203" pitchFamily="34" charset="0"/>
+              </a:rPr>
+              <a:t>Mock</a:t>
+            </a:r>
+            <a:r>
+              <a:rPr lang="pt-BR" sz="2400" dirty="0">
+                <a:solidFill>
+                  <a:schemeClr val="bg2">
+                    <a:lumMod val="25000"/>
+                  </a:schemeClr>
+                </a:solidFill>
+                <a:cs typeface="Segoe UI Light" panose="020B0502040204020203" pitchFamily="34" charset="0"/>
+              </a:rPr>
+              <a:t> Server + APIs</a:t>
+            </a:r>
+          </a:p>
+          <a:p>
+            <a:pPr algn="r"/>
+            <a:endParaRPr lang="pt-BR" sz="2400" dirty="0">
+              <a:solidFill>
+                <a:schemeClr val="bg2">
+                  <a:lumMod val="25000"/>
+                </a:schemeClr>
+              </a:solidFill>
+              <a:cs typeface="Segoe UI Light" panose="020B0502040204020203" pitchFamily="34" charset="0"/>
+            </a:endParaRPr>
+          </a:p>
+          <a:p>
+            <a:pPr algn="r"/>
+            <a:r>
               <a:rPr lang="pt-BR" sz="2400" dirty="0">
                 <a:solidFill>
                   <a:schemeClr val="bg2">
@@ -6234,76 +6303,7 @@
             </a:r>
           </a:p>
           <a:p>
-            <a:pPr algn="r"/>
-            <a:endParaRPr lang="pt-BR" sz="1050" dirty="0">
-              <a:solidFill>
-                <a:schemeClr val="bg2">
-                  <a:lumMod val="25000"/>
-                </a:schemeClr>
-              </a:solidFill>
-              <a:cs typeface="Segoe UI Light" panose="020B0502040204020203" pitchFamily="34" charset="0"/>
-            </a:endParaRPr>
-          </a:p>
-          <a:p>
-            <a:pPr algn="r"/>
-            <a:r>
-              <a:rPr lang="pt-BR" sz="2400" dirty="0" err="1">
-                <a:solidFill>
-                  <a:schemeClr val="bg2">
-                    <a:lumMod val="25000"/>
-                  </a:schemeClr>
-                </a:solidFill>
-                <a:cs typeface="Segoe UI Light" panose="020B0502040204020203" pitchFamily="34" charset="0"/>
-              </a:rPr>
-              <a:t>Workspaces</a:t>
-            </a:r>
-            <a:endParaRPr lang="pt-BR" sz="2400" dirty="0">
-              <a:solidFill>
-                <a:schemeClr val="bg2">
-                  <a:lumMod val="25000"/>
-                </a:schemeClr>
-              </a:solidFill>
-              <a:cs typeface="Segoe UI Light" panose="020B0502040204020203" pitchFamily="34" charset="0"/>
-            </a:endParaRPr>
-          </a:p>
-          <a:p>
-            <a:pPr algn="r"/>
-            <a:endParaRPr lang="pt-BR" sz="2400" dirty="0">
-              <a:solidFill>
-                <a:schemeClr val="bg2">
-                  <a:lumMod val="25000"/>
-                </a:schemeClr>
-              </a:solidFill>
-              <a:cs typeface="Segoe UI Light" panose="020B0502040204020203" pitchFamily="34" charset="0"/>
-            </a:endParaRPr>
-          </a:p>
-          <a:p>
-            <a:pPr algn="r"/>
-            <a:r>
-              <a:rPr lang="pt-BR" sz="2400" dirty="0" err="1">
-                <a:solidFill>
-                  <a:schemeClr val="bg2">
-                    <a:lumMod val="25000"/>
-                  </a:schemeClr>
-                </a:solidFill>
-                <a:cs typeface="Segoe UI Light" panose="020B0502040204020203" pitchFamily="34" charset="0"/>
-              </a:rPr>
-              <a:t>Mock</a:t>
-            </a:r>
-            <a:r>
-              <a:rPr lang="pt-BR" sz="2400" dirty="0">
-                <a:solidFill>
-                  <a:schemeClr val="bg2">
-                    <a:lumMod val="25000"/>
-                  </a:schemeClr>
-                </a:solidFill>
-                <a:cs typeface="Segoe UI Light" panose="020B0502040204020203" pitchFamily="34" charset="0"/>
-              </a:rPr>
-              <a:t> Server</a:t>
-            </a:r>
-          </a:p>
-          <a:p>
-            <a:pPr algn="r"/>
+            <a:pPr lvl="1" algn="r"/>
             <a:endParaRPr lang="pt-BR" sz="2400" dirty="0">
               <a:solidFill>
                 <a:schemeClr val="bg2">
@@ -6325,6 +6325,28 @@
                 <a:cs typeface="Segoe UI Light" panose="020B0502040204020203" pitchFamily="34" charset="0"/>
               </a:rPr>
               <a:t>Collections</a:t>
+            </a:r>
+            <a:r>
+              <a:rPr lang="pt-BR" sz="2400" dirty="0">
+                <a:solidFill>
+                  <a:schemeClr val="bg2">
+                    <a:lumMod val="25000"/>
+                  </a:schemeClr>
+                </a:solidFill>
+                <a:cs typeface="Segoe UI Light" panose="020B0502040204020203" pitchFamily="34" charset="0"/>
+              </a:rPr>
+              <a:t> + </a:t>
+            </a:r>
+            <a:r>
+              <a:rPr lang="pt-BR" sz="2400" dirty="0" err="1">
+                <a:solidFill>
+                  <a:schemeClr val="bg2">
+                    <a:lumMod val="25000"/>
+                  </a:schemeClr>
+                </a:solidFill>
+                <a:cs typeface="Segoe UI Light" panose="020B0502040204020203" pitchFamily="34" charset="0"/>
+              </a:rPr>
+              <a:t>Tests</a:t>
             </a:r>
             <a:endParaRPr lang="pt-BR" sz="2400" dirty="0">
               <a:solidFill>

</xml_diff>